<commit_message>
add minor comments to 04_callbacks
Signed-off-by: Joseph Catanzarite <jcatanza@users.noreply.github.com>
</commit_message>
<xml_diff>
--- a/study_group/meetup_slide_decks/Foundations_Lesson10c..pptx
+++ b/study_group/meetup_slide_decks/Foundations_Lesson10c..pptx
@@ -1910,7 +1910,7 @@
         <p:spPr>
           <a:xfrm>
             <a:off x="504000" y="1326600"/>
-            <a:ext cx="9072000" cy="3288600"/>
+            <a:ext cx="4426920" cy="3288600"/>
           </a:xfrm>
           <a:prstGeom prst="rect">
             <a:avLst/>
@@ -1940,7 +1940,7 @@
               <a:rPr b="0" lang="en-US" sz="3200" spc="-1" strike="noStrike">
                 <a:latin typeface="Arial"/>
               </a:rPr>
-              <a:t>Notebooks</a:t>
+              <a:t>This week:</a:t>
             </a:r>
             <a:endParaRPr b="0" lang="en-US" sz="3200" spc="-1" strike="noStrike">
               <a:latin typeface="Arial"/>
@@ -2012,6 +2012,53 @@
               <a:latin typeface="Arial"/>
             </a:endParaRPr>
           </a:p>
+        </p:txBody>
+      </p:sp>
+      <p:sp>
+        <p:nvSpPr>
+          <p:cNvPr id="43" name="TextShape 3"/>
+          <p:cNvSpPr txBox="1"/>
+          <p:nvPr/>
+        </p:nvSpPr>
+        <p:spPr>
+          <a:xfrm>
+            <a:off x="5152680" y="1326600"/>
+            <a:ext cx="4426920" cy="3288600"/>
+          </a:xfrm>
+          <a:prstGeom prst="rect">
+            <a:avLst/>
+          </a:prstGeom>
+          <a:noFill/>
+          <a:ln>
+            <a:noFill/>
+          </a:ln>
+        </p:spPr>
+        <p:txBody>
+          <a:bodyPr lIns="0" rIns="0" tIns="0" bIns="0">
+            <a:normAutofit/>
+          </a:bodyPr>
+          <a:p>
+            <a:pPr marL="432000" indent="-324000">
+              <a:spcBef>
+                <a:spcPts val="1417"/>
+              </a:spcBef>
+              <a:buClr>
+                <a:srgbClr val="000000"/>
+              </a:buClr>
+              <a:buSzPct val="45000"/>
+              <a:buFont typeface="Wingdings" charset="2"/>
+              <a:buChar char=""/>
+            </a:pPr>
+            <a:r>
+              <a:rPr b="0" lang="en-US" sz="3200" spc="-1" strike="noStrike">
+                <a:latin typeface="Arial"/>
+              </a:rPr>
+              <a:t>Next week:</a:t>
+            </a:r>
+            <a:endParaRPr b="0" lang="en-US" sz="3200" spc="-1" strike="noStrike">
+              <a:latin typeface="Arial"/>
+            </a:endParaRPr>
+          </a:p>
           <a:p>
             <a:pPr lvl="1" marL="864000" indent="-324000">
               <a:spcBef>
@@ -2029,6 +2076,28 @@
                 <a:latin typeface="Arial"/>
               </a:rPr>
               <a:t>06_cuda_cnn_hooks</a:t>
+            </a:r>
+            <a:endParaRPr b="0" lang="en-US" sz="2800" spc="-1" strike="noStrike">
+              <a:latin typeface="Arial"/>
+            </a:endParaRPr>
+          </a:p>
+          <a:p>
+            <a:pPr lvl="1" marL="864000" indent="-324000">
+              <a:spcBef>
+                <a:spcPts val="1134"/>
+              </a:spcBef>
+              <a:buClr>
+                <a:srgbClr val="000000"/>
+              </a:buClr>
+              <a:buSzPct val="75000"/>
+              <a:buFont typeface="Symbol" charset="2"/>
+              <a:buChar char=""/>
+            </a:pPr>
+            <a:r>
+              <a:rPr b="0" lang="en-US" sz="2800" spc="-1" strike="noStrike">
+                <a:latin typeface="Arial"/>
+              </a:rPr>
+              <a:t>07_batchnorm</a:t>
             </a:r>
             <a:endParaRPr b="0" lang="en-US" sz="2800" spc="-1" strike="noStrike">
               <a:latin typeface="Arial"/>

</xml_diff>

<commit_message>
Added a few comments
Signed-off-by: Joseph Catanzarite <jcatanza@users.noreply.github.com>
</commit_message>
<xml_diff>
--- a/study_group/meetup_slide_decks/Foundations_Lesson10c..pptx
+++ b/study_group/meetup_slide_decks/Foundations_Lesson10c..pptx
@@ -1963,28 +1963,6 @@
                 <a:latin typeface="Arial"/>
               </a:rPr>
               <a:t>04_callbacks</a:t>
-            </a:r>
-            <a:endParaRPr b="0" lang="en-US" sz="2800" spc="-1" strike="noStrike">
-              <a:latin typeface="Arial"/>
-            </a:endParaRPr>
-          </a:p>
-          <a:p>
-            <a:pPr lvl="1" marL="864000" indent="-324000">
-              <a:spcBef>
-                <a:spcPts val="1134"/>
-              </a:spcBef>
-              <a:buClr>
-                <a:srgbClr val="000000"/>
-              </a:buClr>
-              <a:buSzPct val="75000"/>
-              <a:buFont typeface="Symbol" charset="2"/>
-              <a:buChar char=""/>
-            </a:pPr>
-            <a:r>
-              <a:rPr b="0" lang="en-US" sz="2800" spc="-1" strike="noStrike">
-                <a:latin typeface="Arial"/>
-              </a:rPr>
-              <a:t>05a_foundations</a:t>
             </a:r>
             <a:endParaRPr b="0" lang="en-US" sz="2800" spc="-1" strike="noStrike">
               <a:latin typeface="Arial"/>

</xml_diff>